<commit_message>
Fixed some color coding in presentation
</commit_message>
<xml_diff>
--- a/Task2-Step-By-Step.pptx
+++ b/Task2-Step-By-Step.pptx
@@ -21903,14 +21903,51 @@
         </p:nvSpPr>
         <p:spPr bwMode="auto">
           <a:xfrm flipH="0" flipV="0">
-            <a:off x="2294604" y="1256744"/>
-            <a:ext cx="1335492" cy="316926"/>
+            <a:off x="2294603" y="1189066"/>
+            <a:ext cx="1335492" cy="384602"/>
           </a:xfrm>
           <a:prstGeom prst="rect">
             <a:avLst/>
           </a:prstGeom>
           <a:solidFill>
             <a:srgbClr val="00B0F0">
+              <a:alpha val="66000"/>
+            </a:srgbClr>
+          </a:solidFill>
+        </p:spPr>
+        <p:style>
+          <a:lnRef idx="2">
+            <a:schemeClr val="accent1">
+              <a:shade val="50000"/>
+            </a:schemeClr>
+          </a:lnRef>
+          <a:fillRef idx="1">
+            <a:schemeClr val="accent1"/>
+          </a:fillRef>
+          <a:effectRef idx="0">
+            <a:schemeClr val="accent1"/>
+          </a:effectRef>
+          <a:fontRef idx="minor">
+            <a:schemeClr val="lt1"/>
+          </a:fontRef>
+        </p:style>
+      </p:sp>
+      <p:sp>
+        <p:nvSpPr>
+          <p:cNvPr id="200199188" name=""/>
+          <p:cNvSpPr/>
+          <p:nvPr/>
+        </p:nvSpPr>
+        <p:spPr bwMode="auto">
+          <a:xfrm flipH="0" flipV="0">
+            <a:off x="3990924" y="1189066"/>
+            <a:ext cx="977652" cy="384602"/>
+          </a:xfrm>
+          <a:prstGeom prst="rect">
+            <a:avLst/>
+          </a:prstGeom>
+          <a:solidFill>
+            <a:srgbClr val="3E32EB">
               <a:alpha val="66000"/>
             </a:srgbClr>
           </a:solidFill>
@@ -27466,8 +27503,8 @@
         </p:nvSpPr>
         <p:spPr bwMode="auto">
           <a:xfrm flipH="0" flipV="0">
-            <a:off x="2369310" y="1256744"/>
-            <a:ext cx="1304365" cy="316926"/>
+            <a:off x="2369309" y="1189067"/>
+            <a:ext cx="1304364" cy="384601"/>
           </a:xfrm>
           <a:prstGeom prst="rect">
             <a:avLst/>
@@ -27476,6 +27513,43 @@
             <a:schemeClr val="accent6">
               <a:alpha val="66000"/>
             </a:schemeClr>
+          </a:solidFill>
+        </p:spPr>
+        <p:style>
+          <a:lnRef idx="2">
+            <a:schemeClr val="accent1">
+              <a:shade val="50000"/>
+            </a:schemeClr>
+          </a:lnRef>
+          <a:fillRef idx="1">
+            <a:schemeClr val="accent1"/>
+          </a:fillRef>
+          <a:effectRef idx="0">
+            <a:schemeClr val="accent1"/>
+          </a:effectRef>
+          <a:fontRef idx="minor">
+            <a:schemeClr val="lt1"/>
+          </a:fontRef>
+        </p:style>
+      </p:sp>
+      <p:sp>
+        <p:nvSpPr>
+          <p:cNvPr id="881986337" name=""/>
+          <p:cNvSpPr/>
+          <p:nvPr/>
+        </p:nvSpPr>
+        <p:spPr bwMode="auto">
+          <a:xfrm flipH="0" flipV="0">
+            <a:off x="4028277" y="1189067"/>
+            <a:ext cx="977652" cy="384602"/>
+          </a:xfrm>
+          <a:prstGeom prst="rect">
+            <a:avLst/>
+          </a:prstGeom>
+          <a:solidFill>
+            <a:srgbClr val="3E32EB">
+              <a:alpha val="66000"/>
+            </a:srgbClr>
           </a:solidFill>
         </p:spPr>
         <p:style>
@@ -44131,8 +44205,8 @@
         </p:nvSpPr>
         <p:spPr bwMode="auto">
           <a:xfrm flipH="0" flipV="0">
-            <a:off x="7928672" y="1151715"/>
-            <a:ext cx="1584513" cy="421956"/>
+            <a:off x="7928671" y="1151714"/>
+            <a:ext cx="1410200" cy="421956"/>
           </a:xfrm>
           <a:prstGeom prst="rect">
             <a:avLst/>
@@ -53469,8 +53543,8 @@
         </p:nvSpPr>
         <p:spPr bwMode="auto">
           <a:xfrm flipH="0" flipV="0">
-            <a:off x="5205629" y="1256744"/>
-            <a:ext cx="1454662" cy="316926"/>
+            <a:off x="5205628" y="1256743"/>
+            <a:ext cx="1281969" cy="316926"/>
           </a:xfrm>
           <a:prstGeom prst="rect">
             <a:avLst/>

</xml_diff>

<commit_message>
Fixed binary spelling error in lefthalf slide
</commit_message>
<xml_diff>
--- a/Task2-Step-By-Step.pptx
+++ b/Task2-Step-By-Step.pptx
@@ -29183,95 +29183,95 @@
                           <a:latin typeface="MesloLGL Nerd Font"/>
                           <a:cs typeface="MesloLGL Nerd Font"/>
                         </a:rPr>
-                        <a:t>1</a:t>
-                      </a:r>
-                      <a:endParaRPr>
-                        <a:latin typeface="MesloLGL Nerd Font"/>
-                        <a:cs typeface="MesloLGL Nerd Font"/>
-                      </a:endParaRPr>
-                    </a:p>
-                  </a:txBody>
-                  <a:tcPr/>
-                </a:tc>
-                <a:tc>
-                  <a:txBody>
-                    <a:bodyPr/>
-                    <a:p>
-                      <a:pPr algn="ctr">
-                        <a:defRPr/>
-                      </a:pPr>
-                      <a:r>
-                        <a:rPr>
-                          <a:latin typeface="MesloLGL Nerd Font"/>
-                          <a:cs typeface="MesloLGL Nerd Font"/>
-                        </a:rPr>
-                        <a:t>1</a:t>
-                      </a:r>
-                      <a:endParaRPr>
-                        <a:latin typeface="MesloLGL Nerd Font"/>
-                        <a:cs typeface="MesloLGL Nerd Font"/>
-                      </a:endParaRPr>
-                    </a:p>
-                  </a:txBody>
-                  <a:tcPr/>
-                </a:tc>
-                <a:tc>
-                  <a:txBody>
-                    <a:bodyPr/>
-                    <a:p>
-                      <a:pPr algn="ctr">
-                        <a:defRPr/>
-                      </a:pPr>
-                      <a:r>
-                        <a:rPr>
-                          <a:latin typeface="MesloLGL Nerd Font"/>
-                          <a:cs typeface="MesloLGL Nerd Font"/>
-                        </a:rPr>
-                        <a:t>1</a:t>
-                      </a:r>
-                      <a:endParaRPr>
-                        <a:latin typeface="MesloLGL Nerd Font"/>
-                        <a:cs typeface="MesloLGL Nerd Font"/>
-                      </a:endParaRPr>
-                    </a:p>
-                  </a:txBody>
-                  <a:tcPr/>
-                </a:tc>
-                <a:tc>
-                  <a:txBody>
-                    <a:bodyPr/>
-                    <a:p>
-                      <a:pPr algn="ctr">
-                        <a:defRPr/>
-                      </a:pPr>
-                      <a:r>
-                        <a:rPr>
-                          <a:latin typeface="MesloLGL Nerd Font"/>
-                          <a:cs typeface="MesloLGL Nerd Font"/>
-                        </a:rPr>
-                        <a:t>0</a:t>
-                      </a:r>
-                      <a:endParaRPr>
-                        <a:latin typeface="MesloLGL Nerd Font"/>
-                        <a:cs typeface="MesloLGL Nerd Font"/>
-                      </a:endParaRPr>
-                    </a:p>
-                  </a:txBody>
-                  <a:tcPr/>
-                </a:tc>
-                <a:tc>
-                  <a:txBody>
-                    <a:bodyPr/>
-                    <a:p>
-                      <a:pPr algn="ctr">
-                        <a:defRPr/>
-                      </a:pPr>
-                      <a:r>
-                        <a:rPr>
-                          <a:latin typeface="MesloLGL Nerd Font"/>
-                          <a:cs typeface="MesloLGL Nerd Font"/>
-                        </a:rPr>
-                        <a:t>1</a:t>
+                        <a:t>0</a:t>
+                      </a:r>
+                      <a:endParaRPr>
+                        <a:latin typeface="MesloLGL Nerd Font"/>
+                        <a:cs typeface="MesloLGL Nerd Font"/>
+                      </a:endParaRPr>
+                    </a:p>
+                  </a:txBody>
+                  <a:tcPr/>
+                </a:tc>
+                <a:tc>
+                  <a:txBody>
+                    <a:bodyPr/>
+                    <a:p>
+                      <a:pPr algn="ctr">
+                        <a:defRPr/>
+                      </a:pPr>
+                      <a:r>
+                        <a:rPr>
+                          <a:latin typeface="MesloLGL Nerd Font"/>
+                          <a:cs typeface="MesloLGL Nerd Font"/>
+                        </a:rPr>
+                        <a:t>0</a:t>
+                      </a:r>
+                      <a:endParaRPr>
+                        <a:latin typeface="MesloLGL Nerd Font"/>
+                        <a:cs typeface="MesloLGL Nerd Font"/>
+                      </a:endParaRPr>
+                    </a:p>
+                  </a:txBody>
+                  <a:tcPr/>
+                </a:tc>
+                <a:tc>
+                  <a:txBody>
+                    <a:bodyPr/>
+                    <a:p>
+                      <a:pPr algn="ctr">
+                        <a:defRPr/>
+                      </a:pPr>
+                      <a:r>
+                        <a:rPr>
+                          <a:latin typeface="MesloLGL Nerd Font"/>
+                          <a:cs typeface="MesloLGL Nerd Font"/>
+                        </a:rPr>
+                        <a:t>0</a:t>
+                      </a:r>
+                      <a:endParaRPr>
+                        <a:latin typeface="MesloLGL Nerd Font"/>
+                        <a:cs typeface="MesloLGL Nerd Font"/>
+                      </a:endParaRPr>
+                    </a:p>
+                  </a:txBody>
+                  <a:tcPr/>
+                </a:tc>
+                <a:tc>
+                  <a:txBody>
+                    <a:bodyPr/>
+                    <a:p>
+                      <a:pPr algn="ctr">
+                        <a:defRPr/>
+                      </a:pPr>
+                      <a:r>
+                        <a:rPr>
+                          <a:latin typeface="MesloLGL Nerd Font"/>
+                          <a:cs typeface="MesloLGL Nerd Font"/>
+                        </a:rPr>
+                        <a:t>0</a:t>
+                      </a:r>
+                      <a:endParaRPr>
+                        <a:latin typeface="MesloLGL Nerd Font"/>
+                        <a:cs typeface="MesloLGL Nerd Font"/>
+                      </a:endParaRPr>
+                    </a:p>
+                  </a:txBody>
+                  <a:tcPr/>
+                </a:tc>
+                <a:tc>
+                  <a:txBody>
+                    <a:bodyPr/>
+                    <a:p>
+                      <a:pPr algn="ctr">
+                        <a:defRPr/>
+                      </a:pPr>
+                      <a:r>
+                        <a:rPr>
+                          <a:latin typeface="MesloLGL Nerd Font"/>
+                          <a:cs typeface="MesloLGL Nerd Font"/>
+                        </a:rPr>
+                        <a:t>0</a:t>
                       </a:r>
                       <a:endParaRPr>
                         <a:latin typeface="MesloLGL Nerd Font"/>

</xml_diff>

<commit_message>
Even more presentation color coding fixed
</commit_message>
<xml_diff>
--- a/Task2-Step-By-Step.pptx
+++ b/Task2-Step-By-Step.pptx
@@ -10477,6 +10477,43 @@
           </a:fontRef>
         </p:style>
       </p:sp>
+      <p:sp>
+        <p:nvSpPr>
+          <p:cNvPr id="2021017341" name=""/>
+          <p:cNvSpPr/>
+          <p:nvPr/>
+        </p:nvSpPr>
+        <p:spPr bwMode="auto">
+          <a:xfrm flipH="0" flipV="0">
+            <a:off x="769358" y="2957677"/>
+            <a:ext cx="2418729" cy="316926"/>
+          </a:xfrm>
+          <a:prstGeom prst="rect">
+            <a:avLst/>
+          </a:prstGeom>
+          <a:solidFill>
+            <a:srgbClr val="FF0000">
+              <a:alpha val="66000"/>
+            </a:srgbClr>
+          </a:solidFill>
+        </p:spPr>
+        <p:style>
+          <a:lnRef idx="2">
+            <a:schemeClr val="accent1">
+              <a:shade val="50000"/>
+            </a:schemeClr>
+          </a:lnRef>
+          <a:fillRef idx="1">
+            <a:schemeClr val="accent1"/>
+          </a:fillRef>
+          <a:effectRef idx="0">
+            <a:schemeClr val="accent1"/>
+          </a:effectRef>
+          <a:fontRef idx="minor">
+            <a:schemeClr val="lt1"/>
+          </a:fontRef>
+        </p:style>
+      </p:sp>
     </p:spTree>
   </p:cSld>
   <p:clrMapOvr>

</xml_diff>

<commit_message>
Fixed exchange half bug not setting storage correctly for frombit=0 and task3 wip
</commit_message>
<xml_diff>
--- a/Task2-Step-By-Step.pptx
+++ b/Task2-Step-By-Step.pptx
@@ -16524,8 +16524,8 @@
         </p:nvSpPr>
         <p:spPr bwMode="auto">
           <a:xfrm flipH="0" flipV="0">
-            <a:off x="94019" y="365123"/>
-            <a:ext cx="11259779" cy="2100168"/>
+            <a:off x="94018" y="715931"/>
+            <a:ext cx="11259778" cy="1749359"/>
           </a:xfrm>
         </p:spPr>
         <p:txBody>
@@ -16534,7 +16534,7 @@
           </a:bodyPr>
           <a:lstStyle/>
           <a:p>
-            <a:pPr algn="l">
+            <a:pPr>
               <a:defRPr/>
             </a:pPr>
             <a:r>
@@ -16768,6 +16768,167 @@
               </a:rPr>
               <a:t>);</a:t>
             </a:r>
+            <a:br>
+              <a:rPr sz="2200" b="0" i="0" u="none">
+                <a:solidFill>
+                  <a:srgbClr val="7E8294"/>
+                </a:solidFill>
+                <a:latin typeface="MesloLGL Nerd Font"/>
+                <a:ea typeface="Droid Sans Mono"/>
+                <a:cs typeface="MesloLGL Nerd Font"/>
+              </a:rPr>
+            </a:br>
+            <a:br>
+              <a:rPr sz="2200" b="0" i="0" u="none">
+                <a:solidFill>
+                  <a:srgbClr val="7E8294"/>
+                </a:solidFill>
+                <a:latin typeface="MesloLGL Nerd Font"/>
+                <a:ea typeface="Droid Sans Mono"/>
+                <a:cs typeface="MesloLGL Nerd Font"/>
+              </a:rPr>
+            </a:br>
+            <a:r>
+              <a:rPr sz="2200" b="0" i="0" u="none">
+                <a:solidFill>
+                  <a:srgbClr val="FB617E"/>
+                </a:solidFill>
+                <a:latin typeface="MesloLGL Nerd Font"/>
+                <a:ea typeface="Droid Sans Mono"/>
+                <a:cs typeface="MesloLGL Nerd Font"/>
+              </a:rPr>
+              <a:t>if</a:t>
+            </a:r>
+            <a:r>
+              <a:rPr sz="2200" b="0" i="0" u="none">
+                <a:solidFill>
+                  <a:srgbClr val="7E8294"/>
+                </a:solidFill>
+                <a:latin typeface="MesloLGL Nerd Font"/>
+                <a:ea typeface="Droid Sans Mono"/>
+                <a:cs typeface="MesloLGL Nerd Font"/>
+              </a:rPr>
+              <a:t>(</a:t>
+            </a:r>
+            <a:r>
+              <a:rPr sz="2200" b="0" i="0" u="none">
+                <a:solidFill>
+                  <a:srgbClr val="E1E3E4"/>
+                </a:solidFill>
+                <a:latin typeface="MesloLGL Nerd Font"/>
+                <a:ea typeface="Droid Sans Mono"/>
+                <a:cs typeface="MesloLGL Nerd Font"/>
+              </a:rPr>
+              <a:t>fromBit </a:t>
+            </a:r>
+            <a:r>
+              <a:rPr sz="2200" b="0" i="0" u="none">
+                <a:solidFill>
+                  <a:srgbClr val="FB617E"/>
+                </a:solidFill>
+                <a:latin typeface="MesloLGL Nerd Font"/>
+                <a:ea typeface="Droid Sans Mono"/>
+                <a:cs typeface="MesloLGL Nerd Font"/>
+              </a:rPr>
+              <a:t>==</a:t>
+            </a:r>
+            <a:r>
+              <a:rPr sz="2200" b="0" i="0" u="none">
+                <a:solidFill>
+                  <a:srgbClr val="E1E3E4"/>
+                </a:solidFill>
+                <a:latin typeface="MesloLGL Nerd Font"/>
+                <a:ea typeface="Droid Sans Mono"/>
+                <a:cs typeface="MesloLGL Nerd Font"/>
+              </a:rPr>
+              <a:t> </a:t>
+            </a:r>
+            <a:r>
+              <a:rPr sz="2200" b="0" i="0" u="none">
+                <a:solidFill>
+                  <a:srgbClr val="BB97EE"/>
+                </a:solidFill>
+                <a:latin typeface="MesloLGL Nerd Font"/>
+                <a:ea typeface="Droid Sans Mono"/>
+                <a:cs typeface="MesloLGL Nerd Font"/>
+              </a:rPr>
+              <a:t>0</a:t>
+            </a:r>
+            <a:r>
+              <a:rPr sz="2200" b="0" i="0" u="none">
+                <a:solidFill>
+                  <a:srgbClr val="7E8294"/>
+                </a:solidFill>
+                <a:latin typeface="MesloLGL Nerd Font"/>
+                <a:ea typeface="Droid Sans Mono"/>
+                <a:cs typeface="MesloLGL Nerd Font"/>
+              </a:rPr>
+              <a:t>)</a:t>
+            </a:r>
+            <a:endParaRPr sz="2200">
+              <a:latin typeface="MesloLGL Nerd Font"/>
+              <a:cs typeface="MesloLGL Nerd Font"/>
+            </a:endParaRPr>
+          </a:p>
+          <a:p>
+            <a:pPr algn="l">
+              <a:defRPr/>
+            </a:pPr>
+            <a:r>
+              <a:rPr sz="2200" b="0" i="0" u="none">
+                <a:solidFill>
+                  <a:srgbClr val="E1E3E4"/>
+                </a:solidFill>
+                <a:latin typeface="MesloLGL Nerd Font"/>
+                <a:ea typeface="Droid Sans Mono"/>
+                <a:cs typeface="MesloLGL Nerd Font"/>
+              </a:rPr>
+              <a:t>        storage </a:t>
+            </a:r>
+            <a:r>
+              <a:rPr sz="2200" b="0" i="0" u="none">
+                <a:solidFill>
+                  <a:srgbClr val="FB617E"/>
+                </a:solidFill>
+                <a:latin typeface="MesloLGL Nerd Font"/>
+                <a:ea typeface="Droid Sans Mono"/>
+                <a:cs typeface="MesloLGL Nerd Font"/>
+              </a:rPr>
+              <a:t>=</a:t>
+            </a:r>
+            <a:r>
+              <a:rPr sz="2200" b="0" i="0" u="none">
+                <a:solidFill>
+                  <a:srgbClr val="E1E3E4"/>
+                </a:solidFill>
+                <a:latin typeface="MesloLGL Nerd Font"/>
+                <a:ea typeface="Droid Sans Mono"/>
+                <a:cs typeface="MesloLGL Nerd Font"/>
+              </a:rPr>
+              <a:t> </a:t>
+            </a:r>
+            <a:r>
+              <a:rPr sz="2200" b="0" i="0" u="none">
+                <a:solidFill>
+                  <a:srgbClr val="BB97EE"/>
+                </a:solidFill>
+                <a:latin typeface="MesloLGL Nerd Font"/>
+                <a:ea typeface="Droid Sans Mono"/>
+                <a:cs typeface="MesloLGL Nerd Font"/>
+              </a:rPr>
+              <a:t>0</a:t>
+            </a:r>
+            <a:r>
+              <a:rPr sz="2200" b="0" i="0" u="none">
+                <a:solidFill>
+                  <a:srgbClr val="7E8294"/>
+                </a:solidFill>
+                <a:latin typeface="MesloLGL Nerd Font"/>
+                <a:ea typeface="Droid Sans Mono"/>
+                <a:cs typeface="MesloLGL Nerd Font"/>
+              </a:rPr>
+              <a:t>;</a:t>
+            </a:r>
             <a:endParaRPr sz="2200">
               <a:latin typeface="MesloLGL Nerd Font"/>
               <a:cs typeface="MesloLGL Nerd Font"/>
@@ -21940,8 +22101,8 @@
         </p:nvSpPr>
         <p:spPr bwMode="auto">
           <a:xfrm flipH="0" flipV="0">
-            <a:off x="2294603" y="1189066"/>
-            <a:ext cx="1335492" cy="384602"/>
+            <a:off x="2322744" y="921372"/>
+            <a:ext cx="1282447" cy="379754"/>
           </a:xfrm>
           <a:prstGeom prst="rect">
             <a:avLst/>
@@ -21977,14 +22138,51 @@
         </p:nvSpPr>
         <p:spPr bwMode="auto">
           <a:xfrm flipH="0" flipV="0">
-            <a:off x="3990924" y="1189066"/>
-            <a:ext cx="977652" cy="384602"/>
+            <a:off x="3997401" y="921372"/>
+            <a:ext cx="971176" cy="379754"/>
           </a:xfrm>
           <a:prstGeom prst="rect">
             <a:avLst/>
           </a:prstGeom>
           <a:solidFill>
             <a:srgbClr val="3E32EB">
+              <a:alpha val="66000"/>
+            </a:srgbClr>
+          </a:solidFill>
+        </p:spPr>
+        <p:style>
+          <a:lnRef idx="2">
+            <a:schemeClr val="accent1">
+              <a:shade val="50000"/>
+            </a:schemeClr>
+          </a:lnRef>
+          <a:fillRef idx="1">
+            <a:schemeClr val="accent1"/>
+          </a:fillRef>
+          <a:effectRef idx="0">
+            <a:schemeClr val="accent1"/>
+          </a:effectRef>
+          <a:fontRef idx="minor">
+            <a:schemeClr val="lt1"/>
+          </a:fontRef>
+        </p:style>
+      </p:sp>
+      <p:sp>
+        <p:nvSpPr>
+          <p:cNvPr id="1789328260" name=""/>
+          <p:cNvSpPr/>
+          <p:nvPr/>
+        </p:nvSpPr>
+        <p:spPr bwMode="auto">
+          <a:xfrm flipH="0" flipV="0">
+            <a:off x="1497742" y="1833281"/>
+            <a:ext cx="1282446" cy="379753"/>
+          </a:xfrm>
+          <a:prstGeom prst="rect">
+            <a:avLst/>
+          </a:prstGeom>
+          <a:solidFill>
+            <a:srgbClr val="00B0F0">
               <a:alpha val="66000"/>
             </a:srgbClr>
           </a:solidFill>

</xml_diff>